<commit_message>
Added diagram to powerpoint.
</commit_message>
<xml_diff>
--- a/Cucumber.pptx
+++ b/Cucumber.pptx
@@ -284,7 +284,7 @@
             <a:fld id="{FEE93A03-1206-4179-8BFD-D87BEE1D9944}" type="datetimeFigureOut">
               <a:rPr lang="en-US" altLang="en-US"/>
               <a:pPr/>
-              <a:t>06/16/15</a:t>
+              <a:t>06/23/15</a:t>
             </a:fld>
             <a:endParaRPr lang="en-US" altLang="en-US"/>
           </a:p>
@@ -493,7 +493,7 @@
             <a:fld id="{23E2F853-0133-45EC-AB11-8D02543E75D3}" type="datetimeFigureOut">
               <a:rPr lang="en-US" altLang="en-US"/>
               <a:pPr/>
-              <a:t>06/16/15</a:t>
+              <a:t>06/23/15</a:t>
             </a:fld>
             <a:endParaRPr lang="en-US" altLang="en-US"/>
           </a:p>
@@ -1007,14 +1007,14 @@
           </a:ln>
           <a:extLst>
             <a:ext uri="{909E8E84-426E-40dd-AFC4-6F175D3DCCD1}">
-              <a14:hiddenFill xmlns:a14="http://schemas.microsoft.com/office/drawing/2010/main" xmlns="">
+              <a14:hiddenFill xmlns="" xmlns:a14="http://schemas.microsoft.com/office/drawing/2010/main">
                 <a:solidFill>
                   <a:srgbClr val="FFFFFF"/>
                 </a:solidFill>
               </a14:hiddenFill>
             </a:ext>
             <a:ext uri="{91240B29-F687-4f45-9708-019B960494DF}">
-              <a14:hiddenLine xmlns:a14="http://schemas.microsoft.com/office/drawing/2010/main" xmlns="" w="9525">
+              <a14:hiddenLine xmlns="" xmlns:a14="http://schemas.microsoft.com/office/drawing/2010/main" w="9525">
                 <a:solidFill>
                   <a:srgbClr val="000000"/>
                 </a:solidFill>
@@ -4568,18 +4568,34 @@
           <a:chExt cx="0" cy="0"/>
         </a:xfrm>
       </p:grpSpPr>
-      <p:sp>
-        <p:nvSpPr>
-          <p:cNvPr id="2" name="Picture Placeholder 1"/>
-          <p:cNvSpPr>
-            <a:spLocks noGrp="1"/>
-          </p:cNvSpPr>
+      <p:pic>
+        <p:nvPicPr>
+          <p:cNvPr id="5" name="Picture Placeholder 4"/>
+          <p:cNvPicPr>
+            <a:picLocks noGrp="1" noChangeAspect="1"/>
+          </p:cNvPicPr>
           <p:nvPr>
             <p:ph type="pic" sz="quarter" idx="10"/>
           </p:nvPr>
-        </p:nvSpPr>
-        <p:spPr/>
-      </p:sp>
+        </p:nvPicPr>
+        <p:blipFill rotWithShape="1">
+          <a:blip r:embed="rId2">
+            <a:extLst>
+              <a:ext uri="{28A0092B-C50C-407E-A947-70E740481C1C}">
+                <a14:useLocalDpi xmlns:a14="http://schemas.microsoft.com/office/drawing/2010/main" val="0"/>
+              </a:ext>
+            </a:extLst>
+          </a:blip>
+          <a:srcRect t="35" b="-1969"/>
+          <a:stretch/>
+        </p:blipFill>
+        <p:spPr>
+          <a:xfrm>
+            <a:off x="783772" y="1558925"/>
+            <a:ext cx="2817468" cy="4857749"/>
+          </a:xfrm>
+        </p:spPr>
+      </p:pic>
       <p:sp>
         <p:nvSpPr>
           <p:cNvPr id="3" name="Text Placeholder 2"/>
@@ -4597,7 +4613,15 @@
           <a:p>
             <a:r>
               <a:rPr lang="en-US" dirty="0" smtClean="0"/>
-              <a:t>Cucumber uses glue code to interact with the application under test.</a:t>
+              <a:t>Cucumber uses </a:t>
+            </a:r>
+            <a:r>
+              <a:rPr lang="en-US" dirty="0" smtClean="0"/>
+              <a:t>support (glue) code </a:t>
+            </a:r>
+            <a:r>
+              <a:rPr lang="en-US" dirty="0" smtClean="0"/>
+              <a:t>to interact with the application under test.</a:t>
             </a:r>
             <a:endParaRPr lang="en-US" dirty="0"/>
           </a:p>
@@ -6635,48 +6659,11 @@
 
 <file path=customXml/item1.xml><?xml version="1.0" encoding="utf-8"?>
 <?mso-contentType ?>
-<spe:Receivers xmlns:spe="http://schemas.microsoft.com/sharepoint/events">
-  <Receiver>
-    <Name>Document ID Generator</Name>
-    <Synchronization>Synchronous</Synchronization>
-    <Type>10001</Type>
-    <SequenceNumber>1000</SequenceNumber>
-    <Assembly>Microsoft.Office.DocumentManagement, Version=14.0.0.0, Culture=neutral, PublicKeyToken=71e9bce111e9429c</Assembly>
-    <Class>Microsoft.Office.DocumentManagement.Internal.DocIdHandler</Class>
-    <Data/>
-    <Filter/>
-  </Receiver>
-  <Receiver>
-    <Name>Document ID Generator</Name>
-    <Synchronization>Synchronous</Synchronization>
-    <Type>10002</Type>
-    <SequenceNumber>1001</SequenceNumber>
-    <Assembly>Microsoft.Office.DocumentManagement, Version=14.0.0.0, Culture=neutral, PublicKeyToken=71e9bce111e9429c</Assembly>
-    <Class>Microsoft.Office.DocumentManagement.Internal.DocIdHandler</Class>
-    <Data/>
-    <Filter/>
-  </Receiver>
-  <Receiver>
-    <Name>Document ID Generator</Name>
-    <Synchronization>Synchronous</Synchronization>
-    <Type>10004</Type>
-    <SequenceNumber>1002</SequenceNumber>
-    <Assembly>Microsoft.Office.DocumentManagement, Version=14.0.0.0, Culture=neutral, PublicKeyToken=71e9bce111e9429c</Assembly>
-    <Class>Microsoft.Office.DocumentManagement.Internal.DocIdHandler</Class>
-    <Data/>
-    <Filter/>
-  </Receiver>
-  <Receiver>
-    <Name>Document ID Generator</Name>
-    <Synchronization>Synchronous</Synchronization>
-    <Type>10006</Type>
-    <SequenceNumber>1003</SequenceNumber>
-    <Assembly>Microsoft.Office.DocumentManagement, Version=14.0.0.0, Culture=neutral, PublicKeyToken=71e9bce111e9429c</Assembly>
-    <Class>Microsoft.Office.DocumentManagement.Internal.DocIdHandler</Class>
-    <Data/>
-    <Filter/>
-  </Receiver>
-</spe:Receivers>
+<FormTemplates xmlns="http://schemas.microsoft.com/sharepoint/v3/contenttype/forms">
+  <Display>DocumentLibraryForm</Display>
+  <Edit>DocumentLibraryForm</Edit>
+  <New>DocumentLibraryForm</New>
+</FormTemplates>
 </file>
 
 <file path=customXml/item2.xml><?xml version="1.0" encoding="utf-8"?>
@@ -6826,27 +6813,64 @@
 
 <file path=customXml/item3.xml><?xml version="1.0" encoding="utf-8"?>
 <?mso-contentType ?>
-<FormTemplates xmlns="http://schemas.microsoft.com/sharepoint/v3/contenttype/forms">
-  <Display>DocumentLibraryForm</Display>
-  <Edit>DocumentLibraryForm</Edit>
-  <New>DocumentLibraryForm</New>
-</FormTemplates>
+<spe:Receivers xmlns:spe="http://schemas.microsoft.com/sharepoint/events">
+  <Receiver>
+    <Name>Document ID Generator</Name>
+    <Synchronization>Synchronous</Synchronization>
+    <Type>10001</Type>
+    <SequenceNumber>1000</SequenceNumber>
+    <Assembly>Microsoft.Office.DocumentManagement, Version=14.0.0.0, Culture=neutral, PublicKeyToken=71e9bce111e9429c</Assembly>
+    <Class>Microsoft.Office.DocumentManagement.Internal.DocIdHandler</Class>
+    <Data/>
+    <Filter/>
+  </Receiver>
+  <Receiver>
+    <Name>Document ID Generator</Name>
+    <Synchronization>Synchronous</Synchronization>
+    <Type>10002</Type>
+    <SequenceNumber>1001</SequenceNumber>
+    <Assembly>Microsoft.Office.DocumentManagement, Version=14.0.0.0, Culture=neutral, PublicKeyToken=71e9bce111e9429c</Assembly>
+    <Class>Microsoft.Office.DocumentManagement.Internal.DocIdHandler</Class>
+    <Data/>
+    <Filter/>
+  </Receiver>
+  <Receiver>
+    <Name>Document ID Generator</Name>
+    <Synchronization>Synchronous</Synchronization>
+    <Type>10004</Type>
+    <SequenceNumber>1002</SequenceNumber>
+    <Assembly>Microsoft.Office.DocumentManagement, Version=14.0.0.0, Culture=neutral, PublicKeyToken=71e9bce111e9429c</Assembly>
+    <Class>Microsoft.Office.DocumentManagement.Internal.DocIdHandler</Class>
+    <Data/>
+    <Filter/>
+  </Receiver>
+  <Receiver>
+    <Name>Document ID Generator</Name>
+    <Synchronization>Synchronous</Synchronization>
+    <Type>10006</Type>
+    <SequenceNumber>1003</SequenceNumber>
+    <Assembly>Microsoft.Office.DocumentManagement, Version=14.0.0.0, Culture=neutral, PublicKeyToken=71e9bce111e9429c</Assembly>
+    <Class>Microsoft.Office.DocumentManagement.Internal.DocIdHandler</Class>
+    <Data/>
+    <Filter/>
+  </Receiver>
+</spe:Receivers>
 </file>
 
 <file path=customXml/item4.xml><?xml version="1.0" encoding="utf-8"?>
+<LongProperties xmlns="http://schemas.microsoft.com/office/2006/metadata/longProperties"/>
+</file>
+
+<file path=customXml/item5.xml><?xml version="1.0" encoding="utf-8"?>
 <p:properties xmlns:p="http://schemas.microsoft.com/office/2006/metadata/properties" xmlns:xsi="http://www.w3.org/2001/XMLSchema-instance" xmlns:pc="http://schemas.microsoft.com/office/infopath/2007/PartnerControls">
   <documentManagement/>
 </p:properties>
 </file>
 
-<file path=customXml/item5.xml><?xml version="1.0" encoding="utf-8"?>
-<LongProperties xmlns="http://schemas.microsoft.com/office/2006/metadata/longProperties"/>
-</file>
-
 <file path=customXml/itemProps1.xml><?xml version="1.0" encoding="utf-8"?>
-<ds:datastoreItem xmlns:ds="http://schemas.openxmlformats.org/officeDocument/2006/customXml" ds:itemID="{747574D2-358A-464E-A333-13B36A347146}">
+<ds:datastoreItem xmlns:ds="http://schemas.openxmlformats.org/officeDocument/2006/customXml" ds:itemID="{9C33C2F5-8CE6-4F71-8053-B7D6E0191948}">
   <ds:schemaRefs>
-    <ds:schemaRef ds:uri="http://schemas.microsoft.com/sharepoint/events"/>
+    <ds:schemaRef ds:uri="http://schemas.microsoft.com/sharepoint/v3/contenttype/forms"/>
   </ds:schemaRefs>
 </ds:datastoreItem>
 </file>
@@ -6870,14 +6894,22 @@
 </file>
 
 <file path=customXml/itemProps3.xml><?xml version="1.0" encoding="utf-8"?>
-<ds:datastoreItem xmlns:ds="http://schemas.openxmlformats.org/officeDocument/2006/customXml" ds:itemID="{9C33C2F5-8CE6-4F71-8053-B7D6E0191948}">
+<ds:datastoreItem xmlns:ds="http://schemas.openxmlformats.org/officeDocument/2006/customXml" ds:itemID="{747574D2-358A-464E-A333-13B36A347146}">
   <ds:schemaRefs>
-    <ds:schemaRef ds:uri="http://schemas.microsoft.com/sharepoint/v3/contenttype/forms"/>
+    <ds:schemaRef ds:uri="http://schemas.microsoft.com/sharepoint/events"/>
   </ds:schemaRefs>
 </ds:datastoreItem>
 </file>
 
 <file path=customXml/itemProps4.xml><?xml version="1.0" encoding="utf-8"?>
+<ds:datastoreItem xmlns:ds="http://schemas.openxmlformats.org/officeDocument/2006/customXml" ds:itemID="{EA472CBF-0E5F-4633-90C8-7A000AA90F89}">
+  <ds:schemaRefs>
+    <ds:schemaRef ds:uri="http://schemas.microsoft.com/office/2006/metadata/longProperties"/>
+  </ds:schemaRefs>
+</ds:datastoreItem>
+</file>
+
+<file path=customXml/itemProps5.xml><?xml version="1.0" encoding="utf-8"?>
 <ds:datastoreItem xmlns:ds="http://schemas.openxmlformats.org/officeDocument/2006/customXml" ds:itemID="{24694BF4-419B-4B0A-A07A-48B56CDAD6BC}">
   <ds:schemaRefs>
     <ds:schemaRef ds:uri="http://schemas.microsoft.com/office/2006/documentManagement/types"/>
@@ -6891,12 +6923,4 @@
     <ds:schemaRef ds:uri="http://www.w3.org/XML/1998/namespace"/>
   </ds:schemaRefs>
 </ds:datastoreItem>
-</file>
-
-<file path=customXml/itemProps5.xml><?xml version="1.0" encoding="utf-8"?>
-<ds:datastoreItem xmlns:ds="http://schemas.openxmlformats.org/officeDocument/2006/customXml" ds:itemID="{EA472CBF-0E5F-4633-90C8-7A000AA90F89}">
-  <ds:schemaRefs>
-    <ds:schemaRef ds:uri="http://schemas.microsoft.com/office/2006/metadata/longProperties"/>
-  </ds:schemaRefs>
-</ds:datastoreItem>
 </file>
</xml_diff>

<commit_message>
Added more stuff to presentation.
</commit_message>
<xml_diff>
--- a/Cucumber.pptx
+++ b/Cucumber.pptx
@@ -6,10 +6,10 @@
     <p:sldMasterId id="2147483697" r:id="rId7"/>
   </p:sldMasterIdLst>
   <p:notesMasterIdLst>
-    <p:notesMasterId r:id="rId24"/>
+    <p:notesMasterId r:id="rId27"/>
   </p:notesMasterIdLst>
   <p:handoutMasterIdLst>
-    <p:handoutMasterId r:id="rId25"/>
+    <p:handoutMasterId r:id="rId28"/>
   </p:handoutMasterIdLst>
   <p:sldIdLst>
     <p:sldId id="264" r:id="rId8"/>
@@ -19,15 +19,18 @@
     <p:sldId id="268" r:id="rId12"/>
     <p:sldId id="269" r:id="rId13"/>
     <p:sldId id="270" r:id="rId14"/>
-    <p:sldId id="273" r:id="rId15"/>
-    <p:sldId id="267" r:id="rId16"/>
-    <p:sldId id="271" r:id="rId17"/>
-    <p:sldId id="272" r:id="rId18"/>
-    <p:sldId id="275" r:id="rId19"/>
-    <p:sldId id="274" r:id="rId20"/>
-    <p:sldId id="279" r:id="rId21"/>
-    <p:sldId id="278" r:id="rId22"/>
-    <p:sldId id="277" r:id="rId23"/>
+    <p:sldId id="280" r:id="rId15"/>
+    <p:sldId id="281" r:id="rId16"/>
+    <p:sldId id="273" r:id="rId17"/>
+    <p:sldId id="267" r:id="rId18"/>
+    <p:sldId id="271" r:id="rId19"/>
+    <p:sldId id="272" r:id="rId20"/>
+    <p:sldId id="275" r:id="rId21"/>
+    <p:sldId id="282" r:id="rId22"/>
+    <p:sldId id="274" r:id="rId23"/>
+    <p:sldId id="279" r:id="rId24"/>
+    <p:sldId id="278" r:id="rId25"/>
+    <p:sldId id="277" r:id="rId26"/>
   </p:sldIdLst>
   <p:sldSz cx="9144000" cy="6858000" type="screen4x3"/>
   <p:notesSz cx="7010400" cy="9296400"/>
@@ -1007,14 +1010,14 @@
           </a:ln>
           <a:extLst>
             <a:ext uri="{909E8E84-426E-40dd-AFC4-6F175D3DCCD1}">
-              <a14:hiddenFill xmlns="" xmlns:a14="http://schemas.microsoft.com/office/drawing/2010/main">
+              <a14:hiddenFill xmlns:a14="http://schemas.microsoft.com/office/drawing/2010/main" xmlns="">
                 <a:solidFill>
                   <a:srgbClr val="FFFFFF"/>
                 </a:solidFill>
               </a14:hiddenFill>
             </a:ext>
             <a:ext uri="{91240B29-F687-4f45-9708-019B960494DF}">
-              <a14:hiddenLine xmlns="" xmlns:a14="http://schemas.microsoft.com/office/drawing/2010/main" w="9525">
+              <a14:hiddenLine xmlns:a14="http://schemas.microsoft.com/office/drawing/2010/main" xmlns="" w="9525">
                 <a:solidFill>
                   <a:srgbClr val="000000"/>
                 </a:solidFill>
@@ -3367,7 +3370,7 @@
           <a:p>
             <a:r>
               <a:rPr lang="en-US" dirty="0" smtClean="0"/>
-              <a:t>Given, When, Then, And, But</a:t>
+              <a:t>Background</a:t>
             </a:r>
           </a:p>
           <a:p>
@@ -3377,47 +3380,7 @@
             </a:pPr>
             <a:r>
               <a:rPr lang="en-US" dirty="0" smtClean="0"/>
-              <a:t>Steps to be executed for the Scenario</a:t>
-            </a:r>
-          </a:p>
-          <a:p>
-            <a:pPr marL="285750" indent="-285750">
-              <a:buFont typeface="Arial" panose="020B0604020202020204" pitchFamily="34" charset="0"/>
-              <a:buChar char="•"/>
-            </a:pPr>
-            <a:r>
-              <a:rPr lang="en-US" dirty="0" smtClean="0"/>
-              <a:t>No functional difference between Given, When, and Then</a:t>
-            </a:r>
-          </a:p>
-          <a:p>
-            <a:pPr marL="971550" lvl="1">
-              <a:buFont typeface="Arial" panose="020B0604020202020204" pitchFamily="34" charset="0"/>
-              <a:buChar char="•"/>
-            </a:pPr>
-            <a:r>
-              <a:rPr lang="en-US" dirty="0" smtClean="0"/>
-              <a:t>Given – put the system in a known state</a:t>
-            </a:r>
-          </a:p>
-          <a:p>
-            <a:pPr marL="971550" lvl="1">
-              <a:buFont typeface="Arial" panose="020B0604020202020204" pitchFamily="34" charset="0"/>
-              <a:buChar char="•"/>
-            </a:pPr>
-            <a:r>
-              <a:rPr lang="en-US" dirty="0" smtClean="0"/>
-              <a:t>When – describe key actions</a:t>
-            </a:r>
-          </a:p>
-          <a:p>
-            <a:pPr marL="971550" lvl="1">
-              <a:buFont typeface="Arial" panose="020B0604020202020204" pitchFamily="34" charset="0"/>
-              <a:buChar char="•"/>
-            </a:pPr>
-            <a:r>
-              <a:rPr lang="en-US" dirty="0" smtClean="0"/>
-              <a:t>Then – Observe outcomes</a:t>
+              <a:t>A block of steps that is executed before each Scenario or Scenario Outline</a:t>
             </a:r>
           </a:p>
         </p:txBody>
@@ -3447,7 +3410,7 @@
       </p:sp>
       <p:pic>
         <p:nvPicPr>
-          <p:cNvPr id="7" name="Picture 6"/>
+          <p:cNvPr id="5" name="Picture 4"/>
           <p:cNvPicPr>
             <a:picLocks noChangeAspect="1"/>
           </p:cNvPicPr>
@@ -3461,8 +3424,8 @@
         </p:blipFill>
         <p:spPr>
           <a:xfrm>
-            <a:off x="37740" y="1987550"/>
-            <a:ext cx="4836340" cy="3671208"/>
+            <a:off x="285749" y="1987550"/>
+            <a:ext cx="4741863" cy="3771900"/>
           </a:xfrm>
           <a:prstGeom prst="rect">
             <a:avLst/>
@@ -3472,7 +3435,7 @@
     </p:spTree>
     <p:extLst>
       <p:ext uri="{BB962C8B-B14F-4D97-AF65-F5344CB8AC3E}">
-        <p14:creationId xmlns:p14="http://schemas.microsoft.com/office/powerpoint/2010/main" val="1332453961"/>
+        <p14:creationId xmlns:p14="http://schemas.microsoft.com/office/powerpoint/2010/main" val="612864005"/>
       </p:ext>
     </p:extLst>
   </p:cSld>
@@ -3523,7 +3486,7 @@
           <a:p>
             <a:r>
               <a:rPr lang="en-US" dirty="0" smtClean="0"/>
-              <a:t>Given, When, Then, And, But</a:t>
+              <a:t>Tags</a:t>
             </a:r>
           </a:p>
           <a:p>
@@ -3533,15 +3496,7 @@
             </a:pPr>
             <a:r>
               <a:rPr lang="en-US" dirty="0" smtClean="0"/>
-              <a:t>And </a:t>
-            </a:r>
-            <a:r>
-              <a:rPr lang="en-US" dirty="0" err="1" smtClean="0"/>
-              <a:t>and</a:t>
-            </a:r>
-            <a:r>
-              <a:rPr lang="en-US" dirty="0" smtClean="0"/>
-              <a:t> But act as whatever they come after</a:t>
+              <a:t>Tags can be used to organize features into groups.</a:t>
             </a:r>
           </a:p>
           <a:p>
@@ -3549,7 +3504,21 @@
               <a:buFont typeface="Arial" panose="020B0604020202020204" pitchFamily="34" charset="0"/>
               <a:buChar char="•"/>
             </a:pPr>
-            <a:endParaRPr lang="en-US" dirty="0" smtClean="0"/>
+            <a:r>
+              <a:rPr lang="en-US" dirty="0" smtClean="0"/>
+              <a:t>Tags can be applied to Scenarios, Scenario Outlines, and Features.</a:t>
+            </a:r>
+          </a:p>
+          <a:p>
+            <a:pPr marL="285750" indent="-285750">
+              <a:buFont typeface="Arial" panose="020B0604020202020204" pitchFamily="34" charset="0"/>
+              <a:buChar char="•"/>
+            </a:pPr>
+            <a:r>
+              <a:rPr lang="en-US" dirty="0" smtClean="0"/>
+              <a:t>There is no limit to how many tags can be used.</a:t>
+            </a:r>
+            <a:endParaRPr lang="en-US" dirty="0"/>
           </a:p>
         </p:txBody>
       </p:sp>
@@ -3578,7 +3547,7 @@
       </p:sp>
       <p:pic>
         <p:nvPicPr>
-          <p:cNvPr id="7" name="Picture 6"/>
+          <p:cNvPr id="5" name="Picture 4"/>
           <p:cNvPicPr>
             <a:picLocks noChangeAspect="1"/>
           </p:cNvPicPr>
@@ -3592,8 +3561,8 @@
         </p:blipFill>
         <p:spPr>
           <a:xfrm>
-            <a:off x="37740" y="1987550"/>
-            <a:ext cx="4836340" cy="3671208"/>
+            <a:off x="310242" y="1987550"/>
+            <a:ext cx="4570413" cy="2555422"/>
           </a:xfrm>
           <a:prstGeom prst="rect">
             <a:avLst/>
@@ -3603,7 +3572,7 @@
     </p:spTree>
     <p:extLst>
       <p:ext uri="{BB962C8B-B14F-4D97-AF65-F5344CB8AC3E}">
-        <p14:creationId xmlns:p14="http://schemas.microsoft.com/office/powerpoint/2010/main" val="2359072845"/>
+        <p14:creationId xmlns:p14="http://schemas.microsoft.com/office/powerpoint/2010/main" val="1343871741"/>
       </p:ext>
     </p:extLst>
   </p:cSld>
@@ -3654,7 +3623,7 @@
           <a:p>
             <a:r>
               <a:rPr lang="en-US" dirty="0" smtClean="0"/>
-              <a:t>Before and After</a:t>
+              <a:t>Given, When, Then, And, But</a:t>
             </a:r>
           </a:p>
           <a:p>
@@ -3664,7 +3633,7 @@
             </a:pPr>
             <a:r>
               <a:rPr lang="en-US" dirty="0" smtClean="0"/>
-              <a:t>Before steps will run before each scenario</a:t>
+              <a:t>Steps to be executed for the Scenario</a:t>
             </a:r>
           </a:p>
           <a:p>
@@ -3674,7 +3643,37 @@
             </a:pPr>
             <a:r>
               <a:rPr lang="en-US" dirty="0" smtClean="0"/>
-              <a:t>After steps will run after each scenario</a:t>
+              <a:t>No functional difference between Given, When, and Then</a:t>
+            </a:r>
+          </a:p>
+          <a:p>
+            <a:pPr marL="971550" lvl="1">
+              <a:buFont typeface="Arial" panose="020B0604020202020204" pitchFamily="34" charset="0"/>
+              <a:buChar char="•"/>
+            </a:pPr>
+            <a:r>
+              <a:rPr lang="en-US" dirty="0" smtClean="0"/>
+              <a:t>Given – put the system in a known state</a:t>
+            </a:r>
+          </a:p>
+          <a:p>
+            <a:pPr marL="971550" lvl="1">
+              <a:buFont typeface="Arial" panose="020B0604020202020204" pitchFamily="34" charset="0"/>
+              <a:buChar char="•"/>
+            </a:pPr>
+            <a:r>
+              <a:rPr lang="en-US" dirty="0" smtClean="0"/>
+              <a:t>When – describe key actions</a:t>
+            </a:r>
+          </a:p>
+          <a:p>
+            <a:pPr marL="971550" lvl="1">
+              <a:buFont typeface="Arial" panose="020B0604020202020204" pitchFamily="34" charset="0"/>
+              <a:buChar char="•"/>
+            </a:pPr>
+            <a:r>
+              <a:rPr lang="en-US" dirty="0" smtClean="0"/>
+              <a:t>Then – Observe outcomes</a:t>
             </a:r>
           </a:p>
         </p:txBody>
@@ -3704,7 +3703,7 @@
       </p:sp>
       <p:pic>
         <p:nvPicPr>
-          <p:cNvPr id="7" name="Picture 6"/>
+          <p:cNvPr id="5" name="Picture 4"/>
           <p:cNvPicPr>
             <a:picLocks noChangeAspect="1"/>
           </p:cNvPicPr>
@@ -3718,8 +3717,8 @@
         </p:blipFill>
         <p:spPr>
           <a:xfrm>
-            <a:off x="37740" y="1987550"/>
-            <a:ext cx="4836340" cy="3671208"/>
+            <a:off x="310242" y="1987550"/>
+            <a:ext cx="4570413" cy="2555422"/>
           </a:xfrm>
           <a:prstGeom prst="rect">
             <a:avLst/>
@@ -3729,7 +3728,7 @@
     </p:spTree>
     <p:extLst>
       <p:ext uri="{BB962C8B-B14F-4D97-AF65-F5344CB8AC3E}">
-        <p14:creationId xmlns:p14="http://schemas.microsoft.com/office/powerpoint/2010/main" val="3177615442"/>
+        <p14:creationId xmlns:p14="http://schemas.microsoft.com/office/powerpoint/2010/main" val="1332453961"/>
       </p:ext>
     </p:extLst>
   </p:cSld>
@@ -3763,6 +3762,76 @@
           <a:chExt cx="0" cy="0"/>
         </a:xfrm>
       </p:grpSpPr>
+      <p:sp>
+        <p:nvSpPr>
+          <p:cNvPr id="3" name="Text Placeholder 2"/>
+          <p:cNvSpPr>
+            <a:spLocks noGrp="1"/>
+          </p:cNvSpPr>
+          <p:nvPr>
+            <p:ph type="body" sz="quarter" idx="11"/>
+          </p:nvPr>
+        </p:nvSpPr>
+        <p:spPr/>
+        <p:txBody>
+          <a:bodyPr/>
+          <a:lstStyle/>
+          <a:p>
+            <a:r>
+              <a:rPr lang="en-US" dirty="0" smtClean="0"/>
+              <a:t>Given, When, Then, And, But</a:t>
+            </a:r>
+          </a:p>
+          <a:p>
+            <a:pPr marL="285750" indent="-285750">
+              <a:buFont typeface="Arial" panose="020B0604020202020204" pitchFamily="34" charset="0"/>
+              <a:buChar char="•"/>
+            </a:pPr>
+            <a:r>
+              <a:rPr lang="en-US" dirty="0" smtClean="0"/>
+              <a:t>And </a:t>
+            </a:r>
+            <a:r>
+              <a:rPr lang="en-US" dirty="0" err="1" smtClean="0"/>
+              <a:t>and</a:t>
+            </a:r>
+            <a:r>
+              <a:rPr lang="en-US" dirty="0" smtClean="0"/>
+              <a:t> But act as whatever they come after</a:t>
+            </a:r>
+          </a:p>
+          <a:p>
+            <a:pPr marL="285750" indent="-285750">
+              <a:buFont typeface="Arial" panose="020B0604020202020204" pitchFamily="34" charset="0"/>
+              <a:buChar char="•"/>
+            </a:pPr>
+            <a:endParaRPr lang="en-US" dirty="0" smtClean="0"/>
+          </a:p>
+        </p:txBody>
+      </p:sp>
+      <p:sp>
+        <p:nvSpPr>
+          <p:cNvPr id="4" name="Title 3"/>
+          <p:cNvSpPr>
+            <a:spLocks noGrp="1"/>
+          </p:cNvSpPr>
+          <p:nvPr>
+            <p:ph type="title"/>
+          </p:nvPr>
+        </p:nvSpPr>
+        <p:spPr/>
+        <p:txBody>
+          <a:bodyPr/>
+          <a:lstStyle/>
+          <a:p>
+            <a:r>
+              <a:rPr lang="en-US" dirty="0" smtClean="0"/>
+              <a:t>The Cucumber Feature File</a:t>
+            </a:r>
+            <a:endParaRPr lang="en-US" dirty="0"/>
+          </a:p>
+        </p:txBody>
+      </p:sp>
       <p:pic>
         <p:nvPicPr>
           <p:cNvPr id="5" name="Picture 4"/>
@@ -3779,81 +3848,18 @@
         </p:blipFill>
         <p:spPr>
           <a:xfrm>
-            <a:off x="0" y="1987550"/>
-            <a:ext cx="4914900" cy="2551339"/>
+            <a:off x="310242" y="1987550"/>
+            <a:ext cx="4570413" cy="2555422"/>
           </a:xfrm>
           <a:prstGeom prst="rect">
             <a:avLst/>
           </a:prstGeom>
         </p:spPr>
       </p:pic>
-      <p:sp>
-        <p:nvSpPr>
-          <p:cNvPr id="3" name="Text Placeholder 2"/>
-          <p:cNvSpPr>
-            <a:spLocks noGrp="1"/>
-          </p:cNvSpPr>
-          <p:nvPr>
-            <p:ph type="body" sz="quarter" idx="11"/>
-          </p:nvPr>
-        </p:nvSpPr>
-        <p:spPr/>
-        <p:txBody>
-          <a:bodyPr/>
-          <a:lstStyle/>
-          <a:p>
-            <a:r>
-              <a:rPr lang="en-US" dirty="0" smtClean="0"/>
-              <a:t>The Step Definition file contains the methods used to execute the feature.</a:t>
-            </a:r>
-          </a:p>
-          <a:p>
-            <a:pPr marL="285750" indent="-285750">
-              <a:buFont typeface="Arial" panose="020B0604020202020204" pitchFamily="34" charset="0"/>
-              <a:buChar char="•"/>
-            </a:pPr>
-            <a:r>
-              <a:rPr lang="en-US" dirty="0" smtClean="0"/>
-              <a:t>Methods are matched to steps via </a:t>
-            </a:r>
-            <a:r>
-              <a:rPr lang="en-US" smtClean="0"/>
-              <a:t>regular expression</a:t>
-            </a:r>
-            <a:endParaRPr lang="en-US" dirty="0" smtClean="0"/>
-          </a:p>
-          <a:p>
-            <a:endParaRPr lang="en-US" dirty="0"/>
-          </a:p>
-        </p:txBody>
-      </p:sp>
-      <p:sp>
-        <p:nvSpPr>
-          <p:cNvPr id="4" name="Title 3"/>
-          <p:cNvSpPr>
-            <a:spLocks noGrp="1"/>
-          </p:cNvSpPr>
-          <p:nvPr>
-            <p:ph type="title"/>
-          </p:nvPr>
-        </p:nvSpPr>
-        <p:spPr/>
-        <p:txBody>
-          <a:bodyPr/>
-          <a:lstStyle/>
-          <a:p>
-            <a:r>
-              <a:rPr lang="en-US" dirty="0" smtClean="0"/>
-              <a:t>The Step Definition File</a:t>
-            </a:r>
-            <a:endParaRPr lang="en-US" dirty="0"/>
-          </a:p>
-        </p:txBody>
-      </p:sp>
     </p:spTree>
     <p:extLst>
       <p:ext uri="{BB962C8B-B14F-4D97-AF65-F5344CB8AC3E}">
-        <p14:creationId xmlns:p14="http://schemas.microsoft.com/office/powerpoint/2010/main" val="869168705"/>
+        <p14:creationId xmlns:p14="http://schemas.microsoft.com/office/powerpoint/2010/main" val="2359072845"/>
       </p:ext>
     </p:extLst>
   </p:cSld>
@@ -3897,22 +3903,35 @@
             <p:ph type="body" sz="quarter" idx="11"/>
           </p:nvPr>
         </p:nvSpPr>
-        <p:spPr>
-          <a:xfrm>
-            <a:off x="457201" y="3020786"/>
-            <a:ext cx="8229600" cy="2967264"/>
-          </a:xfrm>
-        </p:spPr>
+        <p:spPr/>
         <p:txBody>
           <a:bodyPr/>
           <a:lstStyle/>
           <a:p>
-            <a:pPr algn="ctr"/>
-            <a:r>
-              <a:rPr lang="en-US" dirty="0" smtClean="0"/>
-              <a:t>Here’s the fun part!</a:t>
-            </a:r>
-            <a:endParaRPr lang="en-US" dirty="0"/>
+            <a:r>
+              <a:rPr lang="en-US" dirty="0" smtClean="0"/>
+              <a:t>Before and After</a:t>
+            </a:r>
+          </a:p>
+          <a:p>
+            <a:pPr marL="285750" indent="-285750">
+              <a:buFont typeface="Arial" panose="020B0604020202020204" pitchFamily="34" charset="0"/>
+              <a:buChar char="•"/>
+            </a:pPr>
+            <a:r>
+              <a:rPr lang="en-US" dirty="0" smtClean="0"/>
+              <a:t>Before steps will run before each scenario</a:t>
+            </a:r>
+          </a:p>
+          <a:p>
+            <a:pPr marL="285750" indent="-285750">
+              <a:buFont typeface="Arial" panose="020B0604020202020204" pitchFamily="34" charset="0"/>
+              <a:buChar char="•"/>
+            </a:pPr>
+            <a:r>
+              <a:rPr lang="en-US" dirty="0" smtClean="0"/>
+              <a:t>After steps will run after each scenario</a:t>
+            </a:r>
           </a:p>
         </p:txBody>
       </p:sp>
@@ -3933,16 +3952,40 @@
           <a:p>
             <a:r>
               <a:rPr lang="en-US" dirty="0" smtClean="0"/>
-              <a:t>Demonstrations!</a:t>
+              <a:t>The Cucumber Feature File</a:t>
             </a:r>
             <a:endParaRPr lang="en-US" dirty="0"/>
           </a:p>
         </p:txBody>
       </p:sp>
+      <p:pic>
+        <p:nvPicPr>
+          <p:cNvPr id="5" name="Picture 4"/>
+          <p:cNvPicPr>
+            <a:picLocks noChangeAspect="1"/>
+          </p:cNvPicPr>
+          <p:nvPr/>
+        </p:nvPicPr>
+        <p:blipFill>
+          <a:blip r:embed="rId2"/>
+          <a:stretch>
+            <a:fillRect/>
+          </a:stretch>
+        </p:blipFill>
+        <p:spPr>
+          <a:xfrm>
+            <a:off x="310242" y="1987550"/>
+            <a:ext cx="4570413" cy="2555422"/>
+          </a:xfrm>
+          <a:prstGeom prst="rect">
+            <a:avLst/>
+          </a:prstGeom>
+        </p:spPr>
+      </p:pic>
     </p:spTree>
     <p:extLst>
       <p:ext uri="{BB962C8B-B14F-4D97-AF65-F5344CB8AC3E}">
-        <p14:creationId xmlns:p14="http://schemas.microsoft.com/office/powerpoint/2010/main" val="2373896543"/>
+        <p14:creationId xmlns:p14="http://schemas.microsoft.com/office/powerpoint/2010/main" val="3177615442"/>
       </p:ext>
     </p:extLst>
   </p:cSld>
@@ -3986,6 +4029,330 @@
             <p:ph type="body" sz="quarter" idx="11"/>
           </p:nvPr>
         </p:nvSpPr>
+        <p:spPr/>
+        <p:txBody>
+          <a:bodyPr/>
+          <a:lstStyle/>
+          <a:p>
+            <a:r>
+              <a:rPr lang="en-US" dirty="0" smtClean="0"/>
+              <a:t>Because step types are treated the same by cucumber, duplicate step text can lead to </a:t>
+            </a:r>
+            <a:r>
+              <a:rPr lang="en-US" smtClean="0"/>
+              <a:t>confusing results</a:t>
+            </a:r>
+            <a:endParaRPr lang="en-US" dirty="0" smtClean="0"/>
+          </a:p>
+        </p:txBody>
+      </p:sp>
+      <p:sp>
+        <p:nvSpPr>
+          <p:cNvPr id="4" name="Title 3"/>
+          <p:cNvSpPr>
+            <a:spLocks noGrp="1"/>
+          </p:cNvSpPr>
+          <p:nvPr>
+            <p:ph type="title"/>
+          </p:nvPr>
+        </p:nvSpPr>
+        <p:spPr/>
+        <p:txBody>
+          <a:bodyPr/>
+          <a:lstStyle/>
+          <a:p>
+            <a:r>
+              <a:rPr lang="en-US" dirty="0" smtClean="0"/>
+              <a:t>The Cucumber Feature File</a:t>
+            </a:r>
+            <a:endParaRPr lang="en-US" dirty="0"/>
+          </a:p>
+        </p:txBody>
+      </p:sp>
+      <p:pic>
+        <p:nvPicPr>
+          <p:cNvPr id="2" name="Picture 1"/>
+          <p:cNvPicPr>
+            <a:picLocks noChangeAspect="1"/>
+          </p:cNvPicPr>
+          <p:nvPr/>
+        </p:nvPicPr>
+        <p:blipFill>
+          <a:blip r:embed="rId2"/>
+          <a:stretch>
+            <a:fillRect/>
+          </a:stretch>
+        </p:blipFill>
+        <p:spPr>
+          <a:xfrm>
+            <a:off x="457200" y="1987549"/>
+            <a:ext cx="4374544" cy="2282371"/>
+          </a:xfrm>
+          <a:prstGeom prst="rect">
+            <a:avLst/>
+          </a:prstGeom>
+        </p:spPr>
+      </p:pic>
+    </p:spTree>
+    <p:extLst>
+      <p:ext uri="{BB962C8B-B14F-4D97-AF65-F5344CB8AC3E}">
+        <p14:creationId xmlns:p14="http://schemas.microsoft.com/office/powerpoint/2010/main" val="145528518"/>
+      </p:ext>
+    </p:extLst>
+  </p:cSld>
+  <p:clrMapOvr>
+    <a:masterClrMapping/>
+  </p:clrMapOvr>
+  <p:timing>
+    <p:tnLst>
+      <p:par>
+        <p:cTn id="1" dur="indefinite" restart="never" nodeType="tmRoot"/>
+      </p:par>
+    </p:tnLst>
+  </p:timing>
+</p:sld>
+</file>
+
+<file path=ppt/slides/slide16.xml><?xml version="1.0" encoding="utf-8"?>
+<p:sld xmlns:a="http://schemas.openxmlformats.org/drawingml/2006/main" xmlns:r="http://schemas.openxmlformats.org/officeDocument/2006/relationships" xmlns:p="http://schemas.openxmlformats.org/presentationml/2006/main">
+  <p:cSld>
+    <p:spTree>
+      <p:nvGrpSpPr>
+        <p:cNvPr id="1" name=""/>
+        <p:cNvGrpSpPr/>
+        <p:nvPr/>
+      </p:nvGrpSpPr>
+      <p:grpSpPr>
+        <a:xfrm>
+          <a:off x="0" y="0"/>
+          <a:ext cx="0" cy="0"/>
+          <a:chOff x="0" y="0"/>
+          <a:chExt cx="0" cy="0"/>
+        </a:xfrm>
+      </p:grpSpPr>
+      <p:sp>
+        <p:nvSpPr>
+          <p:cNvPr id="3" name="Text Placeholder 2"/>
+          <p:cNvSpPr>
+            <a:spLocks noGrp="1"/>
+          </p:cNvSpPr>
+          <p:nvPr>
+            <p:ph type="body" sz="quarter" idx="11"/>
+          </p:nvPr>
+        </p:nvSpPr>
+        <p:spPr/>
+        <p:txBody>
+          <a:bodyPr/>
+          <a:lstStyle/>
+          <a:p>
+            <a:r>
+              <a:rPr lang="en-US" dirty="0" smtClean="0"/>
+              <a:t>The Step Definition file contains the methods used to execute the feature.</a:t>
+            </a:r>
+          </a:p>
+          <a:p>
+            <a:pPr marL="285750" indent="-285750">
+              <a:buFont typeface="Arial" panose="020B0604020202020204" pitchFamily="34" charset="0"/>
+              <a:buChar char="•"/>
+            </a:pPr>
+            <a:r>
+              <a:rPr lang="en-US" dirty="0" smtClean="0"/>
+              <a:t>Methods are matched to steps via </a:t>
+            </a:r>
+            <a:r>
+              <a:rPr lang="en-US" smtClean="0"/>
+              <a:t>regular expression</a:t>
+            </a:r>
+            <a:endParaRPr lang="en-US" dirty="0" smtClean="0"/>
+          </a:p>
+          <a:p>
+            <a:endParaRPr lang="en-US" dirty="0"/>
+          </a:p>
+        </p:txBody>
+      </p:sp>
+      <p:sp>
+        <p:nvSpPr>
+          <p:cNvPr id="4" name="Title 3"/>
+          <p:cNvSpPr>
+            <a:spLocks noGrp="1"/>
+          </p:cNvSpPr>
+          <p:nvPr>
+            <p:ph type="title"/>
+          </p:nvPr>
+        </p:nvSpPr>
+        <p:spPr/>
+        <p:txBody>
+          <a:bodyPr/>
+          <a:lstStyle/>
+          <a:p>
+            <a:r>
+              <a:rPr lang="en-US" dirty="0" smtClean="0"/>
+              <a:t>The Step Definition File</a:t>
+            </a:r>
+            <a:endParaRPr lang="en-US" dirty="0"/>
+          </a:p>
+        </p:txBody>
+      </p:sp>
+      <p:pic>
+        <p:nvPicPr>
+          <p:cNvPr id="2" name="Picture 1"/>
+          <p:cNvPicPr>
+            <a:picLocks noChangeAspect="1"/>
+          </p:cNvPicPr>
+          <p:nvPr/>
+        </p:nvPicPr>
+        <p:blipFill>
+          <a:blip r:embed="rId2"/>
+          <a:stretch>
+            <a:fillRect/>
+          </a:stretch>
+        </p:blipFill>
+        <p:spPr>
+          <a:xfrm>
+            <a:off x="205468" y="1987550"/>
+            <a:ext cx="4822145" cy="2514600"/>
+          </a:xfrm>
+          <a:prstGeom prst="rect">
+            <a:avLst/>
+          </a:prstGeom>
+        </p:spPr>
+      </p:pic>
+    </p:spTree>
+    <p:extLst>
+      <p:ext uri="{BB962C8B-B14F-4D97-AF65-F5344CB8AC3E}">
+        <p14:creationId xmlns:p14="http://schemas.microsoft.com/office/powerpoint/2010/main" val="869168705"/>
+      </p:ext>
+    </p:extLst>
+  </p:cSld>
+  <p:clrMapOvr>
+    <a:masterClrMapping/>
+  </p:clrMapOvr>
+  <p:timing>
+    <p:tnLst>
+      <p:par>
+        <p:cTn id="1" dur="indefinite" restart="never" nodeType="tmRoot"/>
+      </p:par>
+    </p:tnLst>
+  </p:timing>
+</p:sld>
+</file>
+
+<file path=ppt/slides/slide17.xml><?xml version="1.0" encoding="utf-8"?>
+<p:sld xmlns:a="http://schemas.openxmlformats.org/drawingml/2006/main" xmlns:r="http://schemas.openxmlformats.org/officeDocument/2006/relationships" xmlns:p="http://schemas.openxmlformats.org/presentationml/2006/main">
+  <p:cSld>
+    <p:spTree>
+      <p:nvGrpSpPr>
+        <p:cNvPr id="1" name=""/>
+        <p:cNvGrpSpPr/>
+        <p:nvPr/>
+      </p:nvGrpSpPr>
+      <p:grpSpPr>
+        <a:xfrm>
+          <a:off x="0" y="0"/>
+          <a:ext cx="0" cy="0"/>
+          <a:chOff x="0" y="0"/>
+          <a:chExt cx="0" cy="0"/>
+        </a:xfrm>
+      </p:grpSpPr>
+      <p:sp>
+        <p:nvSpPr>
+          <p:cNvPr id="3" name="Text Placeholder 2"/>
+          <p:cNvSpPr>
+            <a:spLocks noGrp="1"/>
+          </p:cNvSpPr>
+          <p:nvPr>
+            <p:ph type="body" sz="quarter" idx="11"/>
+          </p:nvPr>
+        </p:nvSpPr>
+        <p:spPr>
+          <a:xfrm>
+            <a:off x="457201" y="3020786"/>
+            <a:ext cx="8229600" cy="2967264"/>
+          </a:xfrm>
+        </p:spPr>
+        <p:txBody>
+          <a:bodyPr/>
+          <a:lstStyle/>
+          <a:p>
+            <a:pPr algn="ctr"/>
+            <a:r>
+              <a:rPr lang="en-US" dirty="0" smtClean="0"/>
+              <a:t>Here’s the fun part!</a:t>
+            </a:r>
+            <a:endParaRPr lang="en-US" dirty="0"/>
+          </a:p>
+        </p:txBody>
+      </p:sp>
+      <p:sp>
+        <p:nvSpPr>
+          <p:cNvPr id="4" name="Title 3"/>
+          <p:cNvSpPr>
+            <a:spLocks noGrp="1"/>
+          </p:cNvSpPr>
+          <p:nvPr>
+            <p:ph type="title"/>
+          </p:nvPr>
+        </p:nvSpPr>
+        <p:spPr/>
+        <p:txBody>
+          <a:bodyPr/>
+          <a:lstStyle/>
+          <a:p>
+            <a:r>
+              <a:rPr lang="en-US" dirty="0" smtClean="0"/>
+              <a:t>Demonstrations!</a:t>
+            </a:r>
+            <a:endParaRPr lang="en-US" dirty="0"/>
+          </a:p>
+        </p:txBody>
+      </p:sp>
+    </p:spTree>
+    <p:extLst>
+      <p:ext uri="{BB962C8B-B14F-4D97-AF65-F5344CB8AC3E}">
+        <p14:creationId xmlns:p14="http://schemas.microsoft.com/office/powerpoint/2010/main" val="2373896543"/>
+      </p:ext>
+    </p:extLst>
+  </p:cSld>
+  <p:clrMapOvr>
+    <a:masterClrMapping/>
+  </p:clrMapOvr>
+  <p:timing>
+    <p:tnLst>
+      <p:par>
+        <p:cTn id="1" dur="indefinite" restart="never" nodeType="tmRoot"/>
+      </p:par>
+    </p:tnLst>
+  </p:timing>
+</p:sld>
+</file>
+
+<file path=ppt/slides/slide18.xml><?xml version="1.0" encoding="utf-8"?>
+<p:sld xmlns:a="http://schemas.openxmlformats.org/drawingml/2006/main" xmlns:r="http://schemas.openxmlformats.org/officeDocument/2006/relationships" xmlns:p="http://schemas.openxmlformats.org/presentationml/2006/main">
+  <p:cSld>
+    <p:spTree>
+      <p:nvGrpSpPr>
+        <p:cNvPr id="1" name=""/>
+        <p:cNvGrpSpPr/>
+        <p:nvPr/>
+      </p:nvGrpSpPr>
+      <p:grpSpPr>
+        <a:xfrm>
+          <a:off x="0" y="0"/>
+          <a:ext cx="0" cy="0"/>
+          <a:chOff x="0" y="0"/>
+          <a:chExt cx="0" cy="0"/>
+        </a:xfrm>
+      </p:grpSpPr>
+      <p:sp>
+        <p:nvSpPr>
+          <p:cNvPr id="3" name="Text Placeholder 2"/>
+          <p:cNvSpPr>
+            <a:spLocks noGrp="1"/>
+          </p:cNvSpPr>
+          <p:nvPr>
+            <p:ph type="body" sz="quarter" idx="11"/>
+          </p:nvPr>
+        </p:nvSpPr>
         <p:spPr>
           <a:xfrm>
             <a:off x="457201" y="3339193"/>
@@ -4049,7 +4416,7 @@
 </p:sld>
 </file>
 
-<file path=ppt/slides/slide16.xml><?xml version="1.0" encoding="utf-8"?>
+<file path=ppt/slides/slide19.xml><?xml version="1.0" encoding="utf-8"?>
 <p:sld xmlns:a="http://schemas.openxmlformats.org/drawingml/2006/main" xmlns:r="http://schemas.openxmlformats.org/officeDocument/2006/relationships" xmlns:p="http://schemas.openxmlformats.org/presentationml/2006/main">
   <p:cSld>
     <p:spTree>
@@ -4613,15 +4980,7 @@
           <a:p>
             <a:r>
               <a:rPr lang="en-US" dirty="0" smtClean="0"/>
-              <a:t>Cucumber uses </a:t>
-            </a:r>
-            <a:r>
-              <a:rPr lang="en-US" dirty="0" smtClean="0"/>
-              <a:t>support (glue) code </a:t>
-            </a:r>
-            <a:r>
-              <a:rPr lang="en-US" dirty="0" smtClean="0"/>
-              <a:t>to interact with the application under test.</a:t>
+              <a:t>Cucumber uses support (glue) code to interact with the application under test.</a:t>
             </a:r>
             <a:endParaRPr lang="en-US" dirty="0"/>
           </a:p>
@@ -4764,7 +5123,7 @@
       </p:sp>
       <p:pic>
         <p:nvPicPr>
-          <p:cNvPr id="7" name="Picture 6"/>
+          <p:cNvPr id="6" name="Picture 5"/>
           <p:cNvPicPr>
             <a:picLocks noChangeAspect="1"/>
           </p:cNvPicPr>
@@ -4778,8 +5137,8 @@
         </p:blipFill>
         <p:spPr>
           <a:xfrm>
-            <a:off x="37740" y="1987550"/>
-            <a:ext cx="4836340" cy="3671208"/>
+            <a:off x="310242" y="1987550"/>
+            <a:ext cx="4570413" cy="2555422"/>
           </a:xfrm>
           <a:prstGeom prst="rect">
             <a:avLst/>
@@ -4894,7 +5253,7 @@
       </p:sp>
       <p:pic>
         <p:nvPicPr>
-          <p:cNvPr id="7" name="Picture 6"/>
+          <p:cNvPr id="2" name="Picture 1"/>
           <p:cNvPicPr>
             <a:picLocks noChangeAspect="1"/>
           </p:cNvPicPr>
@@ -4908,8 +5267,8 @@
         </p:blipFill>
         <p:spPr>
           <a:xfrm>
-            <a:off x="37740" y="1987550"/>
-            <a:ext cx="4836340" cy="3671208"/>
+            <a:off x="310242" y="1987550"/>
+            <a:ext cx="4570413" cy="2555422"/>
           </a:xfrm>
           <a:prstGeom prst="rect">
             <a:avLst/>
@@ -5066,7 +5425,7 @@
       </p:sp>
       <p:pic>
         <p:nvPicPr>
-          <p:cNvPr id="2" name="Picture 1"/>
+          <p:cNvPr id="5" name="Picture 4"/>
           <p:cNvPicPr>
             <a:picLocks noChangeAspect="1"/>
           </p:cNvPicPr>
@@ -5080,8 +5439,8 @@
         </p:blipFill>
         <p:spPr>
           <a:xfrm>
-            <a:off x="57150" y="1987550"/>
-            <a:ext cx="4699975" cy="2562225"/>
+            <a:off x="342900" y="1987549"/>
+            <a:ext cx="4171950" cy="2739571"/>
           </a:xfrm>
           <a:prstGeom prst="rect">
             <a:avLst/>
@@ -5140,20 +5499,25 @@
           <a:bodyPr/>
           <a:lstStyle/>
           <a:p>
-            <a:r>
-              <a:rPr lang="en-US" dirty="0" smtClean="0"/>
-              <a:t>Background</a:t>
-            </a:r>
-          </a:p>
-          <a:p>
             <a:pPr marL="285750" indent="-285750">
               <a:buFont typeface="Arial" panose="020B0604020202020204" pitchFamily="34" charset="0"/>
               <a:buChar char="•"/>
             </a:pPr>
             <a:r>
               <a:rPr lang="en-US" dirty="0" smtClean="0"/>
-              <a:t>A block of steps that is executed before each Scenario or Scenario Outline</a:t>
-            </a:r>
+              <a:t>Scenarios shouldn’t be too broad.</a:t>
+            </a:r>
+          </a:p>
+          <a:p>
+            <a:pPr marL="285750" indent="-285750">
+              <a:buFont typeface="Arial" panose="020B0604020202020204" pitchFamily="34" charset="0"/>
+              <a:buChar char="•"/>
+            </a:pPr>
+            <a:r>
+              <a:rPr lang="en-US" dirty="0" smtClean="0"/>
+              <a:t>They should describe specific use cases</a:t>
+            </a:r>
+            <a:endParaRPr lang="en-US" dirty="0" smtClean="0"/>
           </a:p>
         </p:txBody>
       </p:sp>
@@ -5196,8 +5560,8 @@
         </p:blipFill>
         <p:spPr>
           <a:xfrm>
-            <a:off x="60551" y="1987550"/>
-            <a:ext cx="4748213" cy="3657600"/>
+            <a:off x="457200" y="1987550"/>
+            <a:ext cx="4016829" cy="2569067"/>
           </a:xfrm>
           <a:prstGeom prst="rect">
             <a:avLst/>
@@ -5207,7 +5571,7 @@
     </p:spTree>
     <p:extLst>
       <p:ext uri="{BB962C8B-B14F-4D97-AF65-F5344CB8AC3E}">
-        <p14:creationId xmlns:p14="http://schemas.microsoft.com/office/powerpoint/2010/main" val="612864005"/>
+        <p14:creationId xmlns:p14="http://schemas.microsoft.com/office/powerpoint/2010/main" val="2778338201"/>
       </p:ext>
     </p:extLst>
   </p:cSld>
@@ -5256,19 +5620,13 @@
           <a:bodyPr/>
           <a:lstStyle/>
           <a:p>
-            <a:r>
-              <a:rPr lang="en-US" dirty="0" smtClean="0"/>
-              <a:t>Tags</a:t>
-            </a:r>
-          </a:p>
-          <a:p>
             <a:pPr marL="285750" indent="-285750">
               <a:buFont typeface="Arial" panose="020B0604020202020204" pitchFamily="34" charset="0"/>
               <a:buChar char="•"/>
             </a:pPr>
             <a:r>
               <a:rPr lang="en-US" dirty="0" smtClean="0"/>
-              <a:t>Tags can be used to organize features into groups.</a:t>
+              <a:t>Simple actions can be combined into a single step</a:t>
             </a:r>
           </a:p>
           <a:p>
@@ -5278,19 +5636,9 @@
             </a:pPr>
             <a:r>
               <a:rPr lang="en-US" dirty="0" smtClean="0"/>
-              <a:t>Tags can be applied to Scenarios, Scenario Outlines, and Features.</a:t>
-            </a:r>
-          </a:p>
-          <a:p>
-            <a:pPr marL="285750" indent="-285750">
-              <a:buFont typeface="Arial" panose="020B0604020202020204" pitchFamily="34" charset="0"/>
-              <a:buChar char="•"/>
-            </a:pPr>
-            <a:r>
-              <a:rPr lang="en-US" dirty="0" smtClean="0"/>
-              <a:t>There is no limit to how many tags can be used.</a:t>
-            </a:r>
-            <a:endParaRPr lang="en-US" dirty="0"/>
+              <a:t>No need to have four lines describing how to sign into the application</a:t>
+            </a:r>
+            <a:endParaRPr lang="en-US" dirty="0" smtClean="0"/>
           </a:p>
         </p:txBody>
       </p:sp>
@@ -5319,7 +5667,7 @@
       </p:sp>
       <p:pic>
         <p:nvPicPr>
-          <p:cNvPr id="7" name="Picture 6"/>
+          <p:cNvPr id="5" name="Picture 4"/>
           <p:cNvPicPr>
             <a:picLocks noChangeAspect="1"/>
           </p:cNvPicPr>
@@ -5333,8 +5681,8 @@
         </p:blipFill>
         <p:spPr>
           <a:xfrm>
-            <a:off x="37740" y="1987550"/>
-            <a:ext cx="4836340" cy="3671208"/>
+            <a:off x="204108" y="1987550"/>
+            <a:ext cx="4823505" cy="2192564"/>
           </a:xfrm>
           <a:prstGeom prst="rect">
             <a:avLst/>
@@ -5344,7 +5692,7 @@
     </p:spTree>
     <p:extLst>
       <p:ext uri="{BB962C8B-B14F-4D97-AF65-F5344CB8AC3E}">
-        <p14:creationId xmlns:p14="http://schemas.microsoft.com/office/powerpoint/2010/main" val="1343871741"/>
+        <p14:creationId xmlns:p14="http://schemas.microsoft.com/office/powerpoint/2010/main" val="2247642747"/>
       </p:ext>
     </p:extLst>
   </p:cSld>
@@ -6659,11 +7007,48 @@
 
 <file path=customXml/item1.xml><?xml version="1.0" encoding="utf-8"?>
 <?mso-contentType ?>
-<FormTemplates xmlns="http://schemas.microsoft.com/sharepoint/v3/contenttype/forms">
-  <Display>DocumentLibraryForm</Display>
-  <Edit>DocumentLibraryForm</Edit>
-  <New>DocumentLibraryForm</New>
-</FormTemplates>
+<spe:Receivers xmlns:spe="http://schemas.microsoft.com/sharepoint/events">
+  <Receiver>
+    <Name>Document ID Generator</Name>
+    <Synchronization>Synchronous</Synchronization>
+    <Type>10001</Type>
+    <SequenceNumber>1000</SequenceNumber>
+    <Assembly>Microsoft.Office.DocumentManagement, Version=14.0.0.0, Culture=neutral, PublicKeyToken=71e9bce111e9429c</Assembly>
+    <Class>Microsoft.Office.DocumentManagement.Internal.DocIdHandler</Class>
+    <Data/>
+    <Filter/>
+  </Receiver>
+  <Receiver>
+    <Name>Document ID Generator</Name>
+    <Synchronization>Synchronous</Synchronization>
+    <Type>10002</Type>
+    <SequenceNumber>1001</SequenceNumber>
+    <Assembly>Microsoft.Office.DocumentManagement, Version=14.0.0.0, Culture=neutral, PublicKeyToken=71e9bce111e9429c</Assembly>
+    <Class>Microsoft.Office.DocumentManagement.Internal.DocIdHandler</Class>
+    <Data/>
+    <Filter/>
+  </Receiver>
+  <Receiver>
+    <Name>Document ID Generator</Name>
+    <Synchronization>Synchronous</Synchronization>
+    <Type>10004</Type>
+    <SequenceNumber>1002</SequenceNumber>
+    <Assembly>Microsoft.Office.DocumentManagement, Version=14.0.0.0, Culture=neutral, PublicKeyToken=71e9bce111e9429c</Assembly>
+    <Class>Microsoft.Office.DocumentManagement.Internal.DocIdHandler</Class>
+    <Data/>
+    <Filter/>
+  </Receiver>
+  <Receiver>
+    <Name>Document ID Generator</Name>
+    <Synchronization>Synchronous</Synchronization>
+    <Type>10006</Type>
+    <SequenceNumber>1003</SequenceNumber>
+    <Assembly>Microsoft.Office.DocumentManagement, Version=14.0.0.0, Culture=neutral, PublicKeyToken=71e9bce111e9429c</Assembly>
+    <Class>Microsoft.Office.DocumentManagement.Internal.DocIdHandler</Class>
+    <Data/>
+    <Filter/>
+  </Receiver>
+</spe:Receivers>
 </file>
 
 <file path=customXml/item2.xml><?xml version="1.0" encoding="utf-8"?>
@@ -6813,64 +7198,27 @@
 
 <file path=customXml/item3.xml><?xml version="1.0" encoding="utf-8"?>
 <?mso-contentType ?>
-<spe:Receivers xmlns:spe="http://schemas.microsoft.com/sharepoint/events">
-  <Receiver>
-    <Name>Document ID Generator</Name>
-    <Synchronization>Synchronous</Synchronization>
-    <Type>10001</Type>
-    <SequenceNumber>1000</SequenceNumber>
-    <Assembly>Microsoft.Office.DocumentManagement, Version=14.0.0.0, Culture=neutral, PublicKeyToken=71e9bce111e9429c</Assembly>
-    <Class>Microsoft.Office.DocumentManagement.Internal.DocIdHandler</Class>
-    <Data/>
-    <Filter/>
-  </Receiver>
-  <Receiver>
-    <Name>Document ID Generator</Name>
-    <Synchronization>Synchronous</Synchronization>
-    <Type>10002</Type>
-    <SequenceNumber>1001</SequenceNumber>
-    <Assembly>Microsoft.Office.DocumentManagement, Version=14.0.0.0, Culture=neutral, PublicKeyToken=71e9bce111e9429c</Assembly>
-    <Class>Microsoft.Office.DocumentManagement.Internal.DocIdHandler</Class>
-    <Data/>
-    <Filter/>
-  </Receiver>
-  <Receiver>
-    <Name>Document ID Generator</Name>
-    <Synchronization>Synchronous</Synchronization>
-    <Type>10004</Type>
-    <SequenceNumber>1002</SequenceNumber>
-    <Assembly>Microsoft.Office.DocumentManagement, Version=14.0.0.0, Culture=neutral, PublicKeyToken=71e9bce111e9429c</Assembly>
-    <Class>Microsoft.Office.DocumentManagement.Internal.DocIdHandler</Class>
-    <Data/>
-    <Filter/>
-  </Receiver>
-  <Receiver>
-    <Name>Document ID Generator</Name>
-    <Synchronization>Synchronous</Synchronization>
-    <Type>10006</Type>
-    <SequenceNumber>1003</SequenceNumber>
-    <Assembly>Microsoft.Office.DocumentManagement, Version=14.0.0.0, Culture=neutral, PublicKeyToken=71e9bce111e9429c</Assembly>
-    <Class>Microsoft.Office.DocumentManagement.Internal.DocIdHandler</Class>
-    <Data/>
-    <Filter/>
-  </Receiver>
-</spe:Receivers>
+<FormTemplates xmlns="http://schemas.microsoft.com/sharepoint/v3/contenttype/forms">
+  <Display>DocumentLibraryForm</Display>
+  <Edit>DocumentLibraryForm</Edit>
+  <New>DocumentLibraryForm</New>
+</FormTemplates>
 </file>
 
 <file path=customXml/item4.xml><?xml version="1.0" encoding="utf-8"?>
-<LongProperties xmlns="http://schemas.microsoft.com/office/2006/metadata/longProperties"/>
-</file>
-
-<file path=customXml/item5.xml><?xml version="1.0" encoding="utf-8"?>
 <p:properties xmlns:p="http://schemas.microsoft.com/office/2006/metadata/properties" xmlns:xsi="http://www.w3.org/2001/XMLSchema-instance" xmlns:pc="http://schemas.microsoft.com/office/infopath/2007/PartnerControls">
   <documentManagement/>
 </p:properties>
 </file>
 
+<file path=customXml/item5.xml><?xml version="1.0" encoding="utf-8"?>
+<LongProperties xmlns="http://schemas.microsoft.com/office/2006/metadata/longProperties"/>
+</file>
+
 <file path=customXml/itemProps1.xml><?xml version="1.0" encoding="utf-8"?>
-<ds:datastoreItem xmlns:ds="http://schemas.openxmlformats.org/officeDocument/2006/customXml" ds:itemID="{9C33C2F5-8CE6-4F71-8053-B7D6E0191948}">
+<ds:datastoreItem xmlns:ds="http://schemas.openxmlformats.org/officeDocument/2006/customXml" ds:itemID="{747574D2-358A-464E-A333-13B36A347146}">
   <ds:schemaRefs>
-    <ds:schemaRef ds:uri="http://schemas.microsoft.com/sharepoint/v3/contenttype/forms"/>
+    <ds:schemaRef ds:uri="http://schemas.microsoft.com/sharepoint/events"/>
   </ds:schemaRefs>
 </ds:datastoreItem>
 </file>
@@ -6894,22 +7242,14 @@
 </file>
 
 <file path=customXml/itemProps3.xml><?xml version="1.0" encoding="utf-8"?>
-<ds:datastoreItem xmlns:ds="http://schemas.openxmlformats.org/officeDocument/2006/customXml" ds:itemID="{747574D2-358A-464E-A333-13B36A347146}">
+<ds:datastoreItem xmlns:ds="http://schemas.openxmlformats.org/officeDocument/2006/customXml" ds:itemID="{9C33C2F5-8CE6-4F71-8053-B7D6E0191948}">
   <ds:schemaRefs>
-    <ds:schemaRef ds:uri="http://schemas.microsoft.com/sharepoint/events"/>
+    <ds:schemaRef ds:uri="http://schemas.microsoft.com/sharepoint/v3/contenttype/forms"/>
   </ds:schemaRefs>
 </ds:datastoreItem>
 </file>
 
 <file path=customXml/itemProps4.xml><?xml version="1.0" encoding="utf-8"?>
-<ds:datastoreItem xmlns:ds="http://schemas.openxmlformats.org/officeDocument/2006/customXml" ds:itemID="{EA472CBF-0E5F-4633-90C8-7A000AA90F89}">
-  <ds:schemaRefs>
-    <ds:schemaRef ds:uri="http://schemas.microsoft.com/office/2006/metadata/longProperties"/>
-  </ds:schemaRefs>
-</ds:datastoreItem>
-</file>
-
-<file path=customXml/itemProps5.xml><?xml version="1.0" encoding="utf-8"?>
 <ds:datastoreItem xmlns:ds="http://schemas.openxmlformats.org/officeDocument/2006/customXml" ds:itemID="{24694BF4-419B-4B0A-A07A-48B56CDAD6BC}">
   <ds:schemaRefs>
     <ds:schemaRef ds:uri="http://schemas.microsoft.com/office/2006/documentManagement/types"/>
@@ -6923,4 +7263,12 @@
     <ds:schemaRef ds:uri="http://www.w3.org/XML/1998/namespace"/>
   </ds:schemaRefs>
 </ds:datastoreItem>
+</file>
+
+<file path=customXml/itemProps5.xml><?xml version="1.0" encoding="utf-8"?>
+<ds:datastoreItem xmlns:ds="http://schemas.openxmlformats.org/officeDocument/2006/customXml" ds:itemID="{EA472CBF-0E5F-4633-90C8-7A000AA90F89}">
+  <ds:schemaRefs>
+    <ds:schemaRef ds:uri="http://schemas.microsoft.com/office/2006/metadata/longProperties"/>
+  </ds:schemaRefs>
+</ds:datastoreItem>
 </file>
</xml_diff>

<commit_message>
Removed commented code from assertPostPresent.
</commit_message>
<xml_diff>
--- a/Cucumber.pptx
+++ b/Cucumber.pptx
@@ -4036,11 +4036,7 @@
           <a:p>
             <a:r>
               <a:rPr lang="en-US" dirty="0" smtClean="0"/>
-              <a:t>Because step types are treated the same by cucumber, duplicate step text can lead to </a:t>
-            </a:r>
-            <a:r>
-              <a:rPr lang="en-US" smtClean="0"/>
-              <a:t>confusing results</a:t>
+              <a:t>Because step types are treated the same by cucumber, duplicate step text can lead to confusing results</a:t>
             </a:r>
             <a:endParaRPr lang="en-US" dirty="0" smtClean="0"/>
           </a:p>

</xml_diff>